<commit_message>
a few lesson 8 ideas
</commit_message>
<xml_diff>
--- a/UM_DataManagementClass/Lessons/08/08_FirstMeeting.pptx
+++ b/UM_DataManagementClass/Lessons/08/08_FirstMeeting.pptx
@@ -5,11 +5,13 @@
     <p:sldMasterId id="2147483756" r:id="rId1"/>
   </p:sldMasterIdLst>
   <p:notesMasterIdLst>
-    <p:notesMasterId r:id="rId4"/>
+    <p:notesMasterId r:id="rId6"/>
   </p:notesMasterIdLst>
   <p:sldIdLst>
     <p:sldId id="256" r:id="rId2"/>
     <p:sldId id="262" r:id="rId3"/>
+    <p:sldId id="263" r:id="rId4"/>
+    <p:sldId id="264" r:id="rId5"/>
   </p:sldIdLst>
   <p:sldSz cx="12192000" cy="6858000"/>
   <p:notesSz cx="7010400" cy="9296400"/>
@@ -110,7 +112,7 @@
   </p:defaultTextStyle>
   <p:extLst>
     <p:ext uri="{EFAFB233-063F-42B5-8137-9DF3F51BA10A}">
-      <p15:sldGuideLst xmlns:p15="http://schemas.microsoft.com/office/powerpoint/2012/main">
+      <p15:sldGuideLst xmlns:p15="http://schemas.microsoft.com/office/powerpoint/2012/main" xmlns="">
         <p15:guide id="1" orient="horz" pos="2160" userDrawn="1">
           <p15:clr>
             <a:srgbClr val="A4A3A4"/>
@@ -210,7 +212,7 @@
             <a:fld id="{0B10C68B-4B56-4C57-A100-1112E8D05063}" type="datetimeFigureOut">
               <a:rPr lang="en-US" smtClean="0"/>
               <a:pPr/>
-              <a:t>2/18/2016</a:t>
+              <a:t>2/21/2016</a:t>
             </a:fld>
             <a:endParaRPr lang="en-US"/>
           </a:p>
@@ -379,7 +381,7 @@
     </p:spTree>
     <p:extLst>
       <p:ext uri="{BB962C8B-B14F-4D97-AF65-F5344CB8AC3E}">
-        <p14:creationId xmlns:p14="http://schemas.microsoft.com/office/powerpoint/2010/main" val="2616926588"/>
+        <p14:creationId xmlns:p14="http://schemas.microsoft.com/office/powerpoint/2010/main" xmlns="" val="2616926588"/>
       </p:ext>
     </p:extLst>
   </p:cSld>
@@ -554,7 +556,7 @@
     </p:spTree>
     <p:extLst>
       <p:ext uri="{BB962C8B-B14F-4D97-AF65-F5344CB8AC3E}">
-        <p14:creationId xmlns:p14="http://schemas.microsoft.com/office/powerpoint/2010/main" val="111020371"/>
+        <p14:creationId xmlns:p14="http://schemas.microsoft.com/office/powerpoint/2010/main" xmlns="" val="111020371"/>
       </p:ext>
     </p:extLst>
   </p:cSld>
@@ -707,7 +709,7 @@
               <a:pPr>
                 <a:defRPr/>
               </a:pPr>
-              <a:t>2/18/2016</a:t>
+              <a:t>2/21/2016</a:t>
             </a:fld>
             <a:endParaRPr lang="en-US">
               <a:solidFill>
@@ -791,7 +793,7 @@
     </p:spTree>
     <p:extLst>
       <p:ext uri="{BB962C8B-B14F-4D97-AF65-F5344CB8AC3E}">
-        <p14:creationId xmlns:p14="http://schemas.microsoft.com/office/powerpoint/2010/main" val="588844449"/>
+        <p14:creationId xmlns:p14="http://schemas.microsoft.com/office/powerpoint/2010/main" xmlns="" val="588844449"/>
       </p:ext>
     </p:extLst>
   </p:cSld>
@@ -922,7 +924,7 @@
               <a:pPr>
                 <a:defRPr/>
               </a:pPr>
-              <a:t>2/18/2016</a:t>
+              <a:t>2/21/2016</a:t>
             </a:fld>
             <a:endParaRPr lang="en-US">
               <a:solidFill>
@@ -1006,7 +1008,7 @@
     </p:spTree>
     <p:extLst>
       <p:ext uri="{BB962C8B-B14F-4D97-AF65-F5344CB8AC3E}">
-        <p14:creationId xmlns:p14="http://schemas.microsoft.com/office/powerpoint/2010/main" val="2374176888"/>
+        <p14:creationId xmlns:p14="http://schemas.microsoft.com/office/powerpoint/2010/main" xmlns="" val="2374176888"/>
       </p:ext>
     </p:extLst>
   </p:cSld>
@@ -1147,7 +1149,7 @@
               <a:pPr>
                 <a:defRPr/>
               </a:pPr>
-              <a:t>2/18/2016</a:t>
+              <a:t>2/21/2016</a:t>
             </a:fld>
             <a:endParaRPr lang="en-US">
               <a:solidFill>
@@ -1231,7 +1233,7 @@
     </p:spTree>
     <p:extLst>
       <p:ext uri="{BB962C8B-B14F-4D97-AF65-F5344CB8AC3E}">
-        <p14:creationId xmlns:p14="http://schemas.microsoft.com/office/powerpoint/2010/main" val="991584953"/>
+        <p14:creationId xmlns:p14="http://schemas.microsoft.com/office/powerpoint/2010/main" xmlns="" val="991584953"/>
       </p:ext>
     </p:extLst>
   </p:cSld>
@@ -1388,7 +1390,7 @@
               <a:pPr>
                 <a:defRPr/>
               </a:pPr>
-              <a:t>2/18/2016</a:t>
+              <a:t>2/21/2016</a:t>
             </a:fld>
             <a:endParaRPr lang="en-US">
               <a:solidFill>
@@ -1472,7 +1474,7 @@
     </p:spTree>
     <p:extLst>
       <p:ext uri="{BB962C8B-B14F-4D97-AF65-F5344CB8AC3E}">
-        <p14:creationId xmlns:p14="http://schemas.microsoft.com/office/powerpoint/2010/main" val="379613614"/>
+        <p14:creationId xmlns:p14="http://schemas.microsoft.com/office/powerpoint/2010/main" xmlns="" val="379613614"/>
       </p:ext>
     </p:extLst>
   </p:cSld>
@@ -1677,7 +1679,7 @@
               <a:pPr>
                 <a:defRPr/>
               </a:pPr>
-              <a:t>2/18/2016</a:t>
+              <a:t>2/21/2016</a:t>
             </a:fld>
             <a:endParaRPr lang="en-US">
               <a:solidFill>
@@ -1761,7 +1763,7 @@
     </p:spTree>
     <p:extLst>
       <p:ext uri="{BB962C8B-B14F-4D97-AF65-F5344CB8AC3E}">
-        <p14:creationId xmlns:p14="http://schemas.microsoft.com/office/powerpoint/2010/main" val="1749530271"/>
+        <p14:creationId xmlns:p14="http://schemas.microsoft.com/office/powerpoint/2010/main" xmlns="" val="1749530271"/>
       </p:ext>
     </p:extLst>
   </p:cSld>
@@ -1998,7 +2000,7 @@
               <a:pPr>
                 <a:defRPr/>
               </a:pPr>
-              <a:t>2/18/2016</a:t>
+              <a:t>2/21/2016</a:t>
             </a:fld>
             <a:endParaRPr lang="en-US">
               <a:solidFill>
@@ -2082,7 +2084,7 @@
     </p:spTree>
     <p:extLst>
       <p:ext uri="{BB962C8B-B14F-4D97-AF65-F5344CB8AC3E}">
-        <p14:creationId xmlns:p14="http://schemas.microsoft.com/office/powerpoint/2010/main" val="4117643888"/>
+        <p14:creationId xmlns:p14="http://schemas.microsoft.com/office/powerpoint/2010/main" xmlns="" val="4117643888"/>
       </p:ext>
     </p:extLst>
   </p:cSld>
@@ -2458,7 +2460,7 @@
               <a:pPr>
                 <a:defRPr/>
               </a:pPr>
-              <a:t>2/18/2016</a:t>
+              <a:t>2/21/2016</a:t>
             </a:fld>
             <a:endParaRPr lang="en-US">
               <a:solidFill>
@@ -2542,7 +2544,7 @@
     </p:spTree>
     <p:extLst>
       <p:ext uri="{BB962C8B-B14F-4D97-AF65-F5344CB8AC3E}">
-        <p14:creationId xmlns:p14="http://schemas.microsoft.com/office/powerpoint/2010/main" val="3305394207"/>
+        <p14:creationId xmlns:p14="http://schemas.microsoft.com/office/powerpoint/2010/main" xmlns="" val="3305394207"/>
       </p:ext>
     </p:extLst>
   </p:cSld>
@@ -2629,7 +2631,7 @@
               <a:pPr>
                 <a:defRPr/>
               </a:pPr>
-              <a:t>2/18/2016</a:t>
+              <a:t>2/21/2016</a:t>
             </a:fld>
             <a:endParaRPr lang="en-US">
               <a:solidFill>
@@ -2713,7 +2715,7 @@
     </p:spTree>
     <p:extLst>
       <p:ext uri="{BB962C8B-B14F-4D97-AF65-F5344CB8AC3E}">
-        <p14:creationId xmlns:p14="http://schemas.microsoft.com/office/powerpoint/2010/main" val="2564282291"/>
+        <p14:creationId xmlns:p14="http://schemas.microsoft.com/office/powerpoint/2010/main" xmlns="" val="2564282291"/>
       </p:ext>
     </p:extLst>
   </p:cSld>
@@ -2769,7 +2771,7 @@
               <a:pPr>
                 <a:defRPr/>
               </a:pPr>
-              <a:t>2/18/2016</a:t>
+              <a:t>2/21/2016</a:t>
             </a:fld>
             <a:endParaRPr lang="en-US">
               <a:solidFill>
@@ -2853,7 +2855,7 @@
     </p:spTree>
     <p:extLst>
       <p:ext uri="{BB962C8B-B14F-4D97-AF65-F5344CB8AC3E}">
-        <p14:creationId xmlns:p14="http://schemas.microsoft.com/office/powerpoint/2010/main" val="2633152322"/>
+        <p14:creationId xmlns:p14="http://schemas.microsoft.com/office/powerpoint/2010/main" xmlns="" val="2633152322"/>
       </p:ext>
     </p:extLst>
   </p:cSld>
@@ -3091,7 +3093,7 @@
               <a:pPr>
                 <a:defRPr/>
               </a:pPr>
-              <a:t>2/18/2016</a:t>
+              <a:t>2/21/2016</a:t>
             </a:fld>
             <a:endParaRPr lang="en-US">
               <a:solidFill>
@@ -3175,7 +3177,7 @@
     </p:spTree>
     <p:extLst>
       <p:ext uri="{BB962C8B-B14F-4D97-AF65-F5344CB8AC3E}">
-        <p14:creationId xmlns:p14="http://schemas.microsoft.com/office/powerpoint/2010/main" val="4283600683"/>
+        <p14:creationId xmlns:p14="http://schemas.microsoft.com/office/powerpoint/2010/main" xmlns="" val="4283600683"/>
       </p:ext>
     </p:extLst>
   </p:cSld>
@@ -3393,7 +3395,7 @@
               <a:pPr>
                 <a:defRPr/>
               </a:pPr>
-              <a:t>2/18/2016</a:t>
+              <a:t>2/21/2016</a:t>
             </a:fld>
             <a:endParaRPr lang="en-US">
               <a:solidFill>
@@ -3477,7 +3479,7 @@
     </p:spTree>
     <p:extLst>
       <p:ext uri="{BB962C8B-B14F-4D97-AF65-F5344CB8AC3E}">
-        <p14:creationId xmlns:p14="http://schemas.microsoft.com/office/powerpoint/2010/main" val="3406240267"/>
+        <p14:creationId xmlns:p14="http://schemas.microsoft.com/office/powerpoint/2010/main" xmlns="" val="3406240267"/>
       </p:ext>
     </p:extLst>
   </p:cSld>
@@ -3651,7 +3653,7 @@
               <a:pPr>
                 <a:defRPr/>
               </a:pPr>
-              <a:t>2/18/2016</a:t>
+              <a:t>2/21/2016</a:t>
             </a:fld>
             <a:endParaRPr lang="en-US">
               <a:solidFill>
@@ -3771,7 +3773,7 @@
     </p:spTree>
     <p:extLst>
       <p:ext uri="{BB962C8B-B14F-4D97-AF65-F5344CB8AC3E}">
-        <p14:creationId xmlns:p14="http://schemas.microsoft.com/office/powerpoint/2010/main" val="1652920772"/>
+        <p14:creationId xmlns:p14="http://schemas.microsoft.com/office/powerpoint/2010/main" xmlns="" val="1652920772"/>
       </p:ext>
     </p:extLst>
   </p:cSld>
@@ -4101,7 +4103,7 @@
           <a:blip r:embed="rId3" cstate="print">
             <a:extLst>
               <a:ext uri="{28A0092B-C50C-407E-A947-70E740481C1C}">
-                <a14:useLocalDpi xmlns:a14="http://schemas.microsoft.com/office/drawing/2010/main" val="0"/>
+                <a14:useLocalDpi xmlns:a14="http://schemas.microsoft.com/office/drawing/2010/main" xmlns="" val="0"/>
               </a:ext>
             </a:extLst>
           </a:blip>
@@ -4264,7 +4266,7 @@
     </p:spTree>
     <p:extLst>
       <p:ext uri="{BB962C8B-B14F-4D97-AF65-F5344CB8AC3E}">
-        <p14:creationId xmlns:p14="http://schemas.microsoft.com/office/powerpoint/2010/main" val="1875680063"/>
+        <p14:creationId xmlns:p14="http://schemas.microsoft.com/office/powerpoint/2010/main" xmlns="" val="1875680063"/>
       </p:ext>
     </p:extLst>
   </p:cSld>
@@ -4362,26 +4364,22 @@
           <a:p>
             <a:r>
               <a:rPr lang="en-US" dirty="0" smtClean="0"/>
-              <a:t>What is a DCP</a:t>
+              <a:t>Describing Data</a:t>
             </a:r>
           </a:p>
           <a:p>
             <a:r>
               <a:rPr lang="en-US" dirty="0" smtClean="0"/>
-              <a:t>The toolkit</a:t>
-            </a:r>
+              <a:t>Parts of the Whole</a:t>
+            </a:r>
+            <a:endParaRPr lang="en-US" dirty="0" smtClean="0"/>
           </a:p>
           <a:p>
             <a:r>
               <a:rPr lang="en-US" dirty="0" smtClean="0"/>
-              <a:t>An example</a:t>
-            </a:r>
-          </a:p>
-          <a:p>
-            <a:r>
-              <a:rPr lang="en-US" dirty="0" smtClean="0"/>
-              <a:t>Discussion</a:t>
-            </a:r>
+              <a:t>A library perspective</a:t>
+            </a:r>
+            <a:endParaRPr lang="en-US" dirty="0" smtClean="0"/>
           </a:p>
           <a:p>
             <a:endParaRPr lang="en-US" dirty="0" smtClean="0"/>
@@ -4391,7 +4389,7 @@
     </p:spTree>
     <p:extLst>
       <p:ext uri="{BB962C8B-B14F-4D97-AF65-F5344CB8AC3E}">
-        <p14:creationId xmlns:p14="http://schemas.microsoft.com/office/powerpoint/2010/main" val="4075626601"/>
+        <p14:creationId xmlns:p14="http://schemas.microsoft.com/office/powerpoint/2010/main" xmlns="" val="4075626601"/>
       </p:ext>
     </p:extLst>
   </p:cSld>
@@ -4405,6 +4403,140 @@
       </p:par>
     </p:tnLst>
   </p:timing>
+</p:sld>
+</file>
+
+<file path=ppt/slides/slide3.xml><?xml version="1.0" encoding="utf-8"?>
+<p:sld xmlns:a="http://schemas.openxmlformats.org/drawingml/2006/main" xmlns:r="http://schemas.openxmlformats.org/officeDocument/2006/relationships" xmlns:p="http://schemas.openxmlformats.org/presentationml/2006/main">
+  <p:cSld>
+    <p:spTree>
+      <p:nvGrpSpPr>
+        <p:cNvPr id="1" name=""/>
+        <p:cNvGrpSpPr/>
+        <p:nvPr/>
+      </p:nvGrpSpPr>
+      <p:grpSpPr>
+        <a:xfrm>
+          <a:off x="0" y="0"/>
+          <a:ext cx="0" cy="0"/>
+          <a:chOff x="0" y="0"/>
+          <a:chExt cx="0" cy="0"/>
+        </a:xfrm>
+      </p:grpSpPr>
+      <p:sp>
+        <p:nvSpPr>
+          <p:cNvPr id="2" name="Title 1"/>
+          <p:cNvSpPr>
+            <a:spLocks noGrp="1"/>
+          </p:cNvSpPr>
+          <p:nvPr>
+            <p:ph type="title"/>
+          </p:nvPr>
+        </p:nvSpPr>
+        <p:spPr/>
+        <p:txBody>
+          <a:bodyPr/>
+          <a:lstStyle/>
+          <a:p>
+            <a:r>
+              <a:rPr lang="en-US" dirty="0" smtClean="0"/>
+              <a:t>A Love Letter to the Future</a:t>
+            </a:r>
+            <a:endParaRPr lang="en-US" dirty="0"/>
+          </a:p>
+        </p:txBody>
+      </p:sp>
+      <p:sp>
+        <p:nvSpPr>
+          <p:cNvPr id="3" name="Content Placeholder 2"/>
+          <p:cNvSpPr>
+            <a:spLocks noGrp="1"/>
+          </p:cNvSpPr>
+          <p:nvPr>
+            <p:ph idx="1"/>
+          </p:nvPr>
+        </p:nvSpPr>
+        <p:spPr/>
+        <p:txBody>
+          <a:bodyPr/>
+          <a:lstStyle/>
+          <a:p>
+            <a:endParaRPr lang="en-US" dirty="0"/>
+          </a:p>
+        </p:txBody>
+      </p:sp>
+    </p:spTree>
+  </p:cSld>
+  <p:clrMapOvr>
+    <a:masterClrMapping/>
+  </p:clrMapOvr>
+</p:sld>
+</file>
+
+<file path=ppt/slides/slide4.xml><?xml version="1.0" encoding="utf-8"?>
+<p:sld xmlns:a="http://schemas.openxmlformats.org/drawingml/2006/main" xmlns:r="http://schemas.openxmlformats.org/officeDocument/2006/relationships" xmlns:p="http://schemas.openxmlformats.org/presentationml/2006/main">
+  <p:cSld>
+    <p:spTree>
+      <p:nvGrpSpPr>
+        <p:cNvPr id="1" name=""/>
+        <p:cNvGrpSpPr/>
+        <p:nvPr/>
+      </p:nvGrpSpPr>
+      <p:grpSpPr>
+        <a:xfrm>
+          <a:off x="0" y="0"/>
+          <a:ext cx="0" cy="0"/>
+          <a:chOff x="0" y="0"/>
+          <a:chExt cx="0" cy="0"/>
+        </a:xfrm>
+      </p:grpSpPr>
+      <p:sp>
+        <p:nvSpPr>
+          <p:cNvPr id="2" name="Title 1"/>
+          <p:cNvSpPr>
+            <a:spLocks noGrp="1"/>
+          </p:cNvSpPr>
+          <p:nvPr>
+            <p:ph type="title"/>
+          </p:nvPr>
+        </p:nvSpPr>
+        <p:spPr/>
+        <p:txBody>
+          <a:bodyPr/>
+          <a:lstStyle/>
+          <a:p>
+            <a:r>
+              <a:rPr lang="en-US" dirty="0" smtClean="0"/>
+              <a:t>Schemas as Walls</a:t>
+            </a:r>
+            <a:endParaRPr lang="en-US" dirty="0"/>
+          </a:p>
+        </p:txBody>
+      </p:sp>
+      <p:sp>
+        <p:nvSpPr>
+          <p:cNvPr id="3" name="Content Placeholder 2"/>
+          <p:cNvSpPr>
+            <a:spLocks noGrp="1"/>
+          </p:cNvSpPr>
+          <p:nvPr>
+            <p:ph idx="1"/>
+          </p:nvPr>
+        </p:nvSpPr>
+        <p:spPr/>
+        <p:txBody>
+          <a:bodyPr/>
+          <a:lstStyle/>
+          <a:p>
+            <a:endParaRPr lang="en-US"/>
+          </a:p>
+        </p:txBody>
+      </p:sp>
+    </p:spTree>
+  </p:cSld>
+  <p:clrMapOvr>
+    <a:masterClrMapping/>
+  </p:clrMapOvr>
 </p:sld>
 </file>
 
@@ -4663,7 +4795,7 @@
   <a:extraClrSchemeLst/>
   <a:extLst>
     <a:ext uri="{05A4C25C-085E-4340-85A3-A5531E510DB2}">
-      <thm15:themeFamily xmlns:thm15="http://schemas.microsoft.com/office/thememl/2012/main" name="Office Theme" id="{62F939B6-93AF-4DB8-9C6B-D6C7DFDC589F}" vid="{4A3C46E8-61CC-4603-A589-7422A47A8E4A}"/>
+      <thm15:themeFamily xmlns:thm15="http://schemas.microsoft.com/office/thememl/2012/main" xmlns="" name="Office Theme" id="{62F939B6-93AF-4DB8-9C6B-D6C7DFDC589F}" vid="{4A3C46E8-61CC-4603-A589-7422A47A8E4A}"/>
     </a:ext>
   </a:extLst>
 </a:theme>
@@ -4924,7 +5056,7 @@
   <a:extraClrSchemeLst/>
   <a:extLst>
     <a:ext uri="{05A4C25C-085E-4340-85A3-A5531E510DB2}">
-      <thm15:themeFamily xmlns:thm15="http://schemas.microsoft.com/office/thememl/2012/main" name="Office Theme" id="{62F939B6-93AF-4DB8-9C6B-D6C7DFDC589F}" vid="{4A3C46E8-61CC-4603-A589-7422A47A8E4A}"/>
+      <thm15:themeFamily xmlns:thm15="http://schemas.microsoft.com/office/thememl/2012/main" xmlns="" name="Office Theme" id="{62F939B6-93AF-4DB8-9C6B-D6C7DFDC589F}" vid="{4A3C46E8-61CC-4603-A589-7422A47A8E4A}"/>
     </a:ext>
   </a:extLst>
 </a:theme>

</xml_diff>